<commit_message>
Update 18 2G23寺田侑史 視覚とWebデザ_v2.pptx
</commit_message>
<xml_diff>
--- a/18 2G23寺田侑史 視覚とWebデザ_v2.pptx
+++ b/18 2G23寺田侑史 視覚とWebデザ_v2.pptx
@@ -5,7 +5,7 @@
     <p:sldMasterId id="2147483648" r:id="rId1"/>
   </p:sldMasterIdLst>
   <p:notesMasterIdLst>
-    <p:notesMasterId r:id="rId20"/>
+    <p:notesMasterId r:id="rId22"/>
   </p:notesMasterIdLst>
   <p:sldIdLst>
     <p:sldId id="256" r:id="rId2"/>
@@ -26,6 +26,8 @@
     <p:sldId id="302" r:id="rId17"/>
     <p:sldId id="293" r:id="rId18"/>
     <p:sldId id="307" r:id="rId19"/>
+    <p:sldId id="310" r:id="rId20"/>
+    <p:sldId id="309" r:id="rId21"/>
   </p:sldIdLst>
   <p:sldSz cx="12192000" cy="6858000"/>
   <p:notesSz cx="6858000" cy="9144000"/>
@@ -1207,10 +1209,94 @@
   <p:cSld>
     <p:spTree>
       <p:nvGrpSpPr>
+        <p:cNvPr id="1" name=""/>
+        <p:cNvGrpSpPr/>
+        <p:nvPr/>
+      </p:nvGrpSpPr>
+      <p:grpSpPr>
+        <a:xfrm>
+          <a:off x="0" y="0"/>
+          <a:ext cx="0" cy="0"/>
+          <a:chOff x="0" y="0"/>
+          <a:chExt cx="0" cy="0"/>
+        </a:xfrm>
+      </p:grpSpPr>
+      <p:sp>
+        <p:nvSpPr>
+          <p:cNvPr id="2" name="スライド イメージ プレースホルダー 1"/>
+          <p:cNvSpPr>
+            <a:spLocks noGrp="1" noRot="1" noChangeAspect="1"/>
+          </p:cNvSpPr>
+          <p:nvPr>
+            <p:ph type="sldImg"/>
+          </p:nvPr>
+        </p:nvSpPr>
+        <p:spPr/>
+      </p:sp>
+      <p:sp>
+        <p:nvSpPr>
+          <p:cNvPr id="3" name="ノート プレースホルダー 2"/>
+          <p:cNvSpPr>
+            <a:spLocks noGrp="1"/>
+          </p:cNvSpPr>
+          <p:nvPr>
+            <p:ph type="body" idx="1"/>
+          </p:nvPr>
+        </p:nvSpPr>
+        <p:spPr/>
+        <p:txBody>
+          <a:bodyPr/>
+          <a:lstStyle/>
+          <a:p>
+            <a:endParaRPr kumimoji="1" lang="ja-JP" altLang="en-US" dirty="0"/>
+          </a:p>
+        </p:txBody>
+      </p:sp>
+      <p:sp>
+        <p:nvSpPr>
+          <p:cNvPr id="4" name="スライド番号プレースホルダー 3"/>
+          <p:cNvSpPr>
+            <a:spLocks noGrp="1"/>
+          </p:cNvSpPr>
+          <p:nvPr>
+            <p:ph type="sldNum" sz="quarter" idx="5"/>
+          </p:nvPr>
+        </p:nvSpPr>
+        <p:spPr/>
+        <p:txBody>
+          <a:bodyPr/>
+          <a:lstStyle/>
+          <a:p>
+            <a:fld id="{C13EAF32-F6E2-4B46-9DE2-7BEEC2476B8C}" type="slidenum">
+              <a:rPr kumimoji="1" lang="ja-JP" altLang="en-US" smtClean="0"/>
+              <a:t>1</a:t>
+            </a:fld>
+            <a:endParaRPr kumimoji="1" lang="ja-JP" altLang="en-US"/>
+          </a:p>
+        </p:txBody>
+      </p:sp>
+    </p:spTree>
+    <p:extLst>
+      <p:ext uri="{BB962C8B-B14F-4D97-AF65-F5344CB8AC3E}">
+        <p14:creationId xmlns:p14="http://schemas.microsoft.com/office/powerpoint/2010/main" val="992859837"/>
+      </p:ext>
+    </p:extLst>
+  </p:cSld>
+  <p:clrMapOvr>
+    <a:masterClrMapping/>
+  </p:clrMapOvr>
+</p:notes>
+</file>
+
+<file path=ppt/notesSlides/notesSlide10.xml><?xml version="1.0" encoding="utf-8"?>
+<p:notes xmlns:a="http://schemas.openxmlformats.org/drawingml/2006/main" xmlns:r="http://schemas.openxmlformats.org/officeDocument/2006/relationships" xmlns:p="http://schemas.openxmlformats.org/presentationml/2006/main">
+  <p:cSld>
+    <p:spTree>
+      <p:nvGrpSpPr>
         <p:cNvPr id="1" name="">
           <a:extLst>
             <a:ext uri="{FF2B5EF4-FFF2-40B4-BE49-F238E27FC236}">
-              <a16:creationId xmlns:a16="http://schemas.microsoft.com/office/drawing/2014/main" id="{ED1266F7-CE8B-7E86-D189-4F96DF31374A}"/>
+              <a16:creationId xmlns:a16="http://schemas.microsoft.com/office/drawing/2014/main" id="{6F56D6F1-E2FB-C04E-C20A-44FCA85DA04F}"/>
             </a:ext>
           </a:extLst>
         </p:cNvPr>
@@ -1230,7 +1316,7 @@
           <p:cNvPr id="2" name="スライド イメージ プレースホルダー 1">
             <a:extLst>
               <a:ext uri="{FF2B5EF4-FFF2-40B4-BE49-F238E27FC236}">
-                <a16:creationId xmlns:a16="http://schemas.microsoft.com/office/drawing/2014/main" id="{5D72EEA4-4939-395C-2A6E-F53CA3E8CE71}"/>
+                <a16:creationId xmlns:a16="http://schemas.microsoft.com/office/drawing/2014/main" id="{65546AF4-7F2D-FD71-4E45-083D37BFDFC2}"/>
               </a:ext>
             </a:extLst>
           </p:cNvPr>
@@ -1248,7 +1334,7 @@
           <p:cNvPr id="3" name="ノート プレースホルダー 2">
             <a:extLst>
               <a:ext uri="{FF2B5EF4-FFF2-40B4-BE49-F238E27FC236}">
-                <a16:creationId xmlns:a16="http://schemas.microsoft.com/office/drawing/2014/main" id="{8A6CEE16-BCFB-74EB-6D7C-5436B47BAA13}"/>
+                <a16:creationId xmlns:a16="http://schemas.microsoft.com/office/drawing/2014/main" id="{76F495B4-A983-A66B-91F7-0CF2E639AD6C}"/>
               </a:ext>
             </a:extLst>
           </p:cNvPr>
@@ -1273,7 +1359,7 @@
           <p:cNvPr id="4" name="スライド番号プレースホルダー 3">
             <a:extLst>
               <a:ext uri="{FF2B5EF4-FFF2-40B4-BE49-F238E27FC236}">
-                <a16:creationId xmlns:a16="http://schemas.microsoft.com/office/drawing/2014/main" id="{3718CFAE-6EC5-3A33-B061-39354254EEE0}"/>
+                <a16:creationId xmlns:a16="http://schemas.microsoft.com/office/drawing/2014/main" id="{9CBB7ECD-14E3-DD95-29C7-C2A5F029C6F5}"/>
               </a:ext>
             </a:extLst>
           </p:cNvPr>
@@ -1291,7 +1377,7 @@
           <a:p>
             <a:fld id="{C13EAF32-F6E2-4B46-9DE2-7BEEC2476B8C}" type="slidenum">
               <a:rPr kumimoji="1" lang="ja-JP" altLang="en-US" smtClean="0"/>
-              <a:t>2</a:t>
+              <a:t>15</a:t>
             </a:fld>
             <a:endParaRPr kumimoji="1" lang="ja-JP" altLang="en-US"/>
           </a:p>
@@ -1300,7 +1386,7 @@
     </p:spTree>
     <p:extLst>
       <p:ext uri="{BB962C8B-B14F-4D97-AF65-F5344CB8AC3E}">
-        <p14:creationId xmlns:p14="http://schemas.microsoft.com/office/powerpoint/2010/main" val="3553958772"/>
+        <p14:creationId xmlns:p14="http://schemas.microsoft.com/office/powerpoint/2010/main" val="1472373172"/>
       </p:ext>
     </p:extLst>
   </p:cSld>
@@ -1310,7 +1396,7 @@
 </p:notes>
 </file>
 
-<file path=ppt/notesSlides/notesSlide10.xml><?xml version="1.0" encoding="utf-8"?>
+<file path=ppt/notesSlides/notesSlide11.xml><?xml version="1.0" encoding="utf-8"?>
 <p:notes xmlns:a="http://schemas.openxmlformats.org/drawingml/2006/main" xmlns:r="http://schemas.openxmlformats.org/officeDocument/2006/relationships" xmlns:p="http://schemas.openxmlformats.org/presentationml/2006/main">
   <p:cSld>
     <p:spTree>
@@ -1418,7 +1504,223 @@
 </p:notes>
 </file>
 
+<file path=ppt/notesSlides/notesSlide12.xml><?xml version="1.0" encoding="utf-8"?>
+<p:notes xmlns:a="http://schemas.openxmlformats.org/drawingml/2006/main" xmlns:r="http://schemas.openxmlformats.org/officeDocument/2006/relationships" xmlns:p="http://schemas.openxmlformats.org/presentationml/2006/main">
+  <p:cSld>
+    <p:spTree>
+      <p:nvGrpSpPr>
+        <p:cNvPr id="1" name="">
+          <a:extLst>
+            <a:ext uri="{FF2B5EF4-FFF2-40B4-BE49-F238E27FC236}">
+              <a16:creationId xmlns:a16="http://schemas.microsoft.com/office/drawing/2014/main" id="{3E75E4D3-8CF9-E588-EC7C-665F60FFF3D6}"/>
+            </a:ext>
+          </a:extLst>
+        </p:cNvPr>
+        <p:cNvGrpSpPr/>
+        <p:nvPr/>
+      </p:nvGrpSpPr>
+      <p:grpSpPr>
+        <a:xfrm>
+          <a:off x="0" y="0"/>
+          <a:ext cx="0" cy="0"/>
+          <a:chOff x="0" y="0"/>
+          <a:chExt cx="0" cy="0"/>
+        </a:xfrm>
+      </p:grpSpPr>
+      <p:sp>
+        <p:nvSpPr>
+          <p:cNvPr id="2" name="スライド イメージ プレースホルダー 1">
+            <a:extLst>
+              <a:ext uri="{FF2B5EF4-FFF2-40B4-BE49-F238E27FC236}">
+                <a16:creationId xmlns:a16="http://schemas.microsoft.com/office/drawing/2014/main" id="{73C9131C-63DB-A017-3A01-2865914C0C78}"/>
+              </a:ext>
+            </a:extLst>
+          </p:cNvPr>
+          <p:cNvSpPr>
+            <a:spLocks noGrp="1" noRot="1" noChangeAspect="1"/>
+          </p:cNvSpPr>
+          <p:nvPr>
+            <p:ph type="sldImg"/>
+          </p:nvPr>
+        </p:nvSpPr>
+        <p:spPr/>
+      </p:sp>
+      <p:sp>
+        <p:nvSpPr>
+          <p:cNvPr id="3" name="ノート プレースホルダー 2">
+            <a:extLst>
+              <a:ext uri="{FF2B5EF4-FFF2-40B4-BE49-F238E27FC236}">
+                <a16:creationId xmlns:a16="http://schemas.microsoft.com/office/drawing/2014/main" id="{FEB1688B-E98D-8CA6-1D39-EED2C12F69D3}"/>
+              </a:ext>
+            </a:extLst>
+          </p:cNvPr>
+          <p:cNvSpPr>
+            <a:spLocks noGrp="1"/>
+          </p:cNvSpPr>
+          <p:nvPr>
+            <p:ph type="body" idx="1"/>
+          </p:nvPr>
+        </p:nvSpPr>
+        <p:spPr/>
+        <p:txBody>
+          <a:bodyPr/>
+          <a:lstStyle/>
+          <a:p>
+            <a:endParaRPr kumimoji="1" lang="ja-JP" altLang="en-US" dirty="0"/>
+          </a:p>
+        </p:txBody>
+      </p:sp>
+      <p:sp>
+        <p:nvSpPr>
+          <p:cNvPr id="4" name="スライド番号プレースホルダー 3">
+            <a:extLst>
+              <a:ext uri="{FF2B5EF4-FFF2-40B4-BE49-F238E27FC236}">
+                <a16:creationId xmlns:a16="http://schemas.microsoft.com/office/drawing/2014/main" id="{7CB8E2DC-7BC8-3092-D14F-E48770F7661B}"/>
+              </a:ext>
+            </a:extLst>
+          </p:cNvPr>
+          <p:cNvSpPr>
+            <a:spLocks noGrp="1"/>
+          </p:cNvSpPr>
+          <p:nvPr>
+            <p:ph type="sldNum" sz="quarter" idx="5"/>
+          </p:nvPr>
+        </p:nvSpPr>
+        <p:spPr/>
+        <p:txBody>
+          <a:bodyPr/>
+          <a:lstStyle/>
+          <a:p>
+            <a:fld id="{C13EAF32-F6E2-4B46-9DE2-7BEEC2476B8C}" type="slidenum">
+              <a:rPr kumimoji="1" lang="ja-JP" altLang="en-US" smtClean="0"/>
+              <a:t>20</a:t>
+            </a:fld>
+            <a:endParaRPr kumimoji="1" lang="ja-JP" altLang="en-US"/>
+          </a:p>
+        </p:txBody>
+      </p:sp>
+    </p:spTree>
+    <p:extLst>
+      <p:ext uri="{BB962C8B-B14F-4D97-AF65-F5344CB8AC3E}">
+        <p14:creationId xmlns:p14="http://schemas.microsoft.com/office/powerpoint/2010/main" val="709739227"/>
+      </p:ext>
+    </p:extLst>
+  </p:cSld>
+  <p:clrMapOvr>
+    <a:masterClrMapping/>
+  </p:clrMapOvr>
+</p:notes>
+</file>
+
 <file path=ppt/notesSlides/notesSlide2.xml><?xml version="1.0" encoding="utf-8"?>
+<p:notes xmlns:a="http://schemas.openxmlformats.org/drawingml/2006/main" xmlns:r="http://schemas.openxmlformats.org/officeDocument/2006/relationships" xmlns:p="http://schemas.openxmlformats.org/presentationml/2006/main">
+  <p:cSld>
+    <p:spTree>
+      <p:nvGrpSpPr>
+        <p:cNvPr id="1" name="">
+          <a:extLst>
+            <a:ext uri="{FF2B5EF4-FFF2-40B4-BE49-F238E27FC236}">
+              <a16:creationId xmlns:a16="http://schemas.microsoft.com/office/drawing/2014/main" id="{ED1266F7-CE8B-7E86-D189-4F96DF31374A}"/>
+            </a:ext>
+          </a:extLst>
+        </p:cNvPr>
+        <p:cNvGrpSpPr/>
+        <p:nvPr/>
+      </p:nvGrpSpPr>
+      <p:grpSpPr>
+        <a:xfrm>
+          <a:off x="0" y="0"/>
+          <a:ext cx="0" cy="0"/>
+          <a:chOff x="0" y="0"/>
+          <a:chExt cx="0" cy="0"/>
+        </a:xfrm>
+      </p:grpSpPr>
+      <p:sp>
+        <p:nvSpPr>
+          <p:cNvPr id="2" name="スライド イメージ プレースホルダー 1">
+            <a:extLst>
+              <a:ext uri="{FF2B5EF4-FFF2-40B4-BE49-F238E27FC236}">
+                <a16:creationId xmlns:a16="http://schemas.microsoft.com/office/drawing/2014/main" id="{5D72EEA4-4939-395C-2A6E-F53CA3E8CE71}"/>
+              </a:ext>
+            </a:extLst>
+          </p:cNvPr>
+          <p:cNvSpPr>
+            <a:spLocks noGrp="1" noRot="1" noChangeAspect="1"/>
+          </p:cNvSpPr>
+          <p:nvPr>
+            <p:ph type="sldImg"/>
+          </p:nvPr>
+        </p:nvSpPr>
+        <p:spPr/>
+      </p:sp>
+      <p:sp>
+        <p:nvSpPr>
+          <p:cNvPr id="3" name="ノート プレースホルダー 2">
+            <a:extLst>
+              <a:ext uri="{FF2B5EF4-FFF2-40B4-BE49-F238E27FC236}">
+                <a16:creationId xmlns:a16="http://schemas.microsoft.com/office/drawing/2014/main" id="{8A6CEE16-BCFB-74EB-6D7C-5436B47BAA13}"/>
+              </a:ext>
+            </a:extLst>
+          </p:cNvPr>
+          <p:cNvSpPr>
+            <a:spLocks noGrp="1"/>
+          </p:cNvSpPr>
+          <p:nvPr>
+            <p:ph type="body" idx="1"/>
+          </p:nvPr>
+        </p:nvSpPr>
+        <p:spPr/>
+        <p:txBody>
+          <a:bodyPr/>
+          <a:lstStyle/>
+          <a:p>
+            <a:endParaRPr kumimoji="1" lang="ja-JP" altLang="en-US" dirty="0"/>
+          </a:p>
+        </p:txBody>
+      </p:sp>
+      <p:sp>
+        <p:nvSpPr>
+          <p:cNvPr id="4" name="スライド番号プレースホルダー 3">
+            <a:extLst>
+              <a:ext uri="{FF2B5EF4-FFF2-40B4-BE49-F238E27FC236}">
+                <a16:creationId xmlns:a16="http://schemas.microsoft.com/office/drawing/2014/main" id="{3718CFAE-6EC5-3A33-B061-39354254EEE0}"/>
+              </a:ext>
+            </a:extLst>
+          </p:cNvPr>
+          <p:cNvSpPr>
+            <a:spLocks noGrp="1"/>
+          </p:cNvSpPr>
+          <p:nvPr>
+            <p:ph type="sldNum" sz="quarter" idx="5"/>
+          </p:nvPr>
+        </p:nvSpPr>
+        <p:spPr/>
+        <p:txBody>
+          <a:bodyPr/>
+          <a:lstStyle/>
+          <a:p>
+            <a:fld id="{C13EAF32-F6E2-4B46-9DE2-7BEEC2476B8C}" type="slidenum">
+              <a:rPr kumimoji="1" lang="ja-JP" altLang="en-US" smtClean="0"/>
+              <a:t>2</a:t>
+            </a:fld>
+            <a:endParaRPr kumimoji="1" lang="ja-JP" altLang="en-US"/>
+          </a:p>
+        </p:txBody>
+      </p:sp>
+    </p:spTree>
+    <p:extLst>
+      <p:ext uri="{BB962C8B-B14F-4D97-AF65-F5344CB8AC3E}">
+        <p14:creationId xmlns:p14="http://schemas.microsoft.com/office/powerpoint/2010/main" val="3553958772"/>
+      </p:ext>
+    </p:extLst>
+  </p:cSld>
+  <p:clrMapOvr>
+    <a:masterClrMapping/>
+  </p:clrMapOvr>
+</p:notes>
+</file>
+
+<file path=ppt/notesSlides/notesSlide3.xml><?xml version="1.0" encoding="utf-8"?>
 <p:notes xmlns:a="http://schemas.openxmlformats.org/drawingml/2006/main" xmlns:r="http://schemas.openxmlformats.org/officeDocument/2006/relationships" xmlns:p="http://schemas.openxmlformats.org/presentationml/2006/main">
   <p:cSld>
     <p:spTree>
@@ -1526,7 +1828,7 @@
 </p:notes>
 </file>
 
-<file path=ppt/notesSlides/notesSlide3.xml><?xml version="1.0" encoding="utf-8"?>
+<file path=ppt/notesSlides/notesSlide4.xml><?xml version="1.0" encoding="utf-8"?>
 <p:notes xmlns:a="http://schemas.openxmlformats.org/drawingml/2006/main" xmlns:r="http://schemas.openxmlformats.org/officeDocument/2006/relationships" xmlns:p="http://schemas.openxmlformats.org/presentationml/2006/main">
   <p:cSld>
     <p:spTree>
@@ -1634,7 +1936,7 @@
 </p:notes>
 </file>
 
-<file path=ppt/notesSlides/notesSlide4.xml><?xml version="1.0" encoding="utf-8"?>
+<file path=ppt/notesSlides/notesSlide5.xml><?xml version="1.0" encoding="utf-8"?>
 <p:notes xmlns:a="http://schemas.openxmlformats.org/drawingml/2006/main" xmlns:r="http://schemas.openxmlformats.org/officeDocument/2006/relationships" xmlns:p="http://schemas.openxmlformats.org/presentationml/2006/main">
   <p:cSld>
     <p:spTree>
@@ -1742,7 +2044,7 @@
 </p:notes>
 </file>
 
-<file path=ppt/notesSlides/notesSlide5.xml><?xml version="1.0" encoding="utf-8"?>
+<file path=ppt/notesSlides/notesSlide6.xml><?xml version="1.0" encoding="utf-8"?>
 <p:notes xmlns:a="http://schemas.openxmlformats.org/drawingml/2006/main" xmlns:r="http://schemas.openxmlformats.org/officeDocument/2006/relationships" xmlns:p="http://schemas.openxmlformats.org/presentationml/2006/main">
   <p:cSld>
     <p:spTree>
@@ -1850,7 +2152,7 @@
 </p:notes>
 </file>
 
-<file path=ppt/notesSlides/notesSlide6.xml><?xml version="1.0" encoding="utf-8"?>
+<file path=ppt/notesSlides/notesSlide7.xml><?xml version="1.0" encoding="utf-8"?>
 <p:notes xmlns:a="http://schemas.openxmlformats.org/drawingml/2006/main" xmlns:r="http://schemas.openxmlformats.org/officeDocument/2006/relationships" xmlns:p="http://schemas.openxmlformats.org/presentationml/2006/main">
   <p:cSld>
     <p:spTree>
@@ -1958,7 +2260,7 @@
 </p:notes>
 </file>
 
-<file path=ppt/notesSlides/notesSlide7.xml><?xml version="1.0" encoding="utf-8"?>
+<file path=ppt/notesSlides/notesSlide8.xml><?xml version="1.0" encoding="utf-8"?>
 <p:notes xmlns:a="http://schemas.openxmlformats.org/drawingml/2006/main" xmlns:r="http://schemas.openxmlformats.org/officeDocument/2006/relationships" xmlns:p="http://schemas.openxmlformats.org/presentationml/2006/main">
   <p:cSld>
     <p:spTree>
@@ -2042,7 +2344,7 @@
 </p:notes>
 </file>
 
-<file path=ppt/notesSlides/notesSlide8.xml><?xml version="1.0" encoding="utf-8"?>
+<file path=ppt/notesSlides/notesSlide9.xml><?xml version="1.0" encoding="utf-8"?>
 <p:notes xmlns:a="http://schemas.openxmlformats.org/drawingml/2006/main" xmlns:r="http://schemas.openxmlformats.org/officeDocument/2006/relationships" xmlns:p="http://schemas.openxmlformats.org/presentationml/2006/main">
   <p:cSld>
     <p:spTree>
@@ -2141,114 +2443,6 @@
     <p:extLst>
       <p:ext uri="{BB962C8B-B14F-4D97-AF65-F5344CB8AC3E}">
         <p14:creationId xmlns:p14="http://schemas.microsoft.com/office/powerpoint/2010/main" val="1613694955"/>
-      </p:ext>
-    </p:extLst>
-  </p:cSld>
-  <p:clrMapOvr>
-    <a:masterClrMapping/>
-  </p:clrMapOvr>
-</p:notes>
-</file>
-
-<file path=ppt/notesSlides/notesSlide9.xml><?xml version="1.0" encoding="utf-8"?>
-<p:notes xmlns:a="http://schemas.openxmlformats.org/drawingml/2006/main" xmlns:r="http://schemas.openxmlformats.org/officeDocument/2006/relationships" xmlns:p="http://schemas.openxmlformats.org/presentationml/2006/main">
-  <p:cSld>
-    <p:spTree>
-      <p:nvGrpSpPr>
-        <p:cNvPr id="1" name="">
-          <a:extLst>
-            <a:ext uri="{FF2B5EF4-FFF2-40B4-BE49-F238E27FC236}">
-              <a16:creationId xmlns:a16="http://schemas.microsoft.com/office/drawing/2014/main" id="{6F56D6F1-E2FB-C04E-C20A-44FCA85DA04F}"/>
-            </a:ext>
-          </a:extLst>
-        </p:cNvPr>
-        <p:cNvGrpSpPr/>
-        <p:nvPr/>
-      </p:nvGrpSpPr>
-      <p:grpSpPr>
-        <a:xfrm>
-          <a:off x="0" y="0"/>
-          <a:ext cx="0" cy="0"/>
-          <a:chOff x="0" y="0"/>
-          <a:chExt cx="0" cy="0"/>
-        </a:xfrm>
-      </p:grpSpPr>
-      <p:sp>
-        <p:nvSpPr>
-          <p:cNvPr id="2" name="スライド イメージ プレースホルダー 1">
-            <a:extLst>
-              <a:ext uri="{FF2B5EF4-FFF2-40B4-BE49-F238E27FC236}">
-                <a16:creationId xmlns:a16="http://schemas.microsoft.com/office/drawing/2014/main" id="{65546AF4-7F2D-FD71-4E45-083D37BFDFC2}"/>
-              </a:ext>
-            </a:extLst>
-          </p:cNvPr>
-          <p:cNvSpPr>
-            <a:spLocks noGrp="1" noRot="1" noChangeAspect="1"/>
-          </p:cNvSpPr>
-          <p:nvPr>
-            <p:ph type="sldImg"/>
-          </p:nvPr>
-        </p:nvSpPr>
-        <p:spPr/>
-      </p:sp>
-      <p:sp>
-        <p:nvSpPr>
-          <p:cNvPr id="3" name="ノート プレースホルダー 2">
-            <a:extLst>
-              <a:ext uri="{FF2B5EF4-FFF2-40B4-BE49-F238E27FC236}">
-                <a16:creationId xmlns:a16="http://schemas.microsoft.com/office/drawing/2014/main" id="{76F495B4-A983-A66B-91F7-0CF2E639AD6C}"/>
-              </a:ext>
-            </a:extLst>
-          </p:cNvPr>
-          <p:cNvSpPr>
-            <a:spLocks noGrp="1"/>
-          </p:cNvSpPr>
-          <p:nvPr>
-            <p:ph type="body" idx="1"/>
-          </p:nvPr>
-        </p:nvSpPr>
-        <p:spPr/>
-        <p:txBody>
-          <a:bodyPr/>
-          <a:lstStyle/>
-          <a:p>
-            <a:endParaRPr kumimoji="1" lang="ja-JP" altLang="en-US" dirty="0"/>
-          </a:p>
-        </p:txBody>
-      </p:sp>
-      <p:sp>
-        <p:nvSpPr>
-          <p:cNvPr id="4" name="スライド番号プレースホルダー 3">
-            <a:extLst>
-              <a:ext uri="{FF2B5EF4-FFF2-40B4-BE49-F238E27FC236}">
-                <a16:creationId xmlns:a16="http://schemas.microsoft.com/office/drawing/2014/main" id="{9CBB7ECD-14E3-DD95-29C7-C2A5F029C6F5}"/>
-              </a:ext>
-            </a:extLst>
-          </p:cNvPr>
-          <p:cNvSpPr>
-            <a:spLocks noGrp="1"/>
-          </p:cNvSpPr>
-          <p:nvPr>
-            <p:ph type="sldNum" sz="quarter" idx="5"/>
-          </p:nvPr>
-        </p:nvSpPr>
-        <p:spPr/>
-        <p:txBody>
-          <a:bodyPr/>
-          <a:lstStyle/>
-          <a:p>
-            <a:fld id="{C13EAF32-F6E2-4B46-9DE2-7BEEC2476B8C}" type="slidenum">
-              <a:rPr kumimoji="1" lang="ja-JP" altLang="en-US" smtClean="0"/>
-              <a:t>15</a:t>
-            </a:fld>
-            <a:endParaRPr kumimoji="1" lang="ja-JP" altLang="en-US"/>
-          </a:p>
-        </p:txBody>
-      </p:sp>
-    </p:spTree>
-    <p:extLst>
-      <p:ext uri="{BB962C8B-B14F-4D97-AF65-F5344CB8AC3E}">
-        <p14:creationId xmlns:p14="http://schemas.microsoft.com/office/powerpoint/2010/main" val="1472373172"/>
       </p:ext>
     </p:extLst>
   </p:cSld>
@@ -5919,7 +6113,7 @@
           <p:nvPr/>
         </p:nvPicPr>
         <p:blipFill>
-          <a:blip r:embed="rId2">
+          <a:blip r:embed="rId3">
             <a:extLst>
               <a:ext uri="{28A0092B-C50C-407E-A947-70E740481C1C}">
                 <a14:useLocalDpi xmlns:a14="http://schemas.microsoft.com/office/drawing/2010/main" val="0"/>
@@ -6687,13 +6881,13 @@
   <p:clrMapOvr>
     <a:masterClrMapping/>
   </p:clrMapOvr>
-  <mc:AlternateContent xmlns:mc="http://schemas.openxmlformats.org/markup-compatibility/2006">
-    <mc:Choice xmlns:p14="http://schemas.microsoft.com/office/powerpoint/2010/main" Requires="p14">
+  <mc:AlternateContent xmlns:mc="http://schemas.openxmlformats.org/markup-compatibility/2006" xmlns:p14="http://schemas.microsoft.com/office/powerpoint/2010/main">
+    <mc:Choice Requires="p14">
       <p:transition spd="med" p14:dur="700">
         <p:fade/>
       </p:transition>
     </mc:Choice>
-    <mc:Fallback>
+    <mc:Fallback xmlns="">
       <p:transition spd="med">
         <p:fade/>
       </p:transition>
@@ -8143,13 +8337,13 @@
   <p:clrMapOvr>
     <a:masterClrMapping/>
   </p:clrMapOvr>
-  <mc:AlternateContent xmlns:mc="http://schemas.openxmlformats.org/markup-compatibility/2006">
-    <mc:Choice xmlns:p159="http://schemas.microsoft.com/office/powerpoint/2015/09/main" Requires="p159">
+  <mc:AlternateContent xmlns:mc="http://schemas.openxmlformats.org/markup-compatibility/2006" xmlns:p159="http://schemas.microsoft.com/office/powerpoint/2015/09/main">
+    <mc:Choice Requires="p159">
       <p:transition spd="slow">
         <p159:morph option="byObject"/>
       </p:transition>
     </mc:Choice>
-    <mc:Fallback>
+    <mc:Fallback xmlns="">
       <p:transition spd="slow">
         <p:fade/>
       </p:transition>
@@ -9423,13 +9617,13 @@
   <p:clrMapOvr>
     <a:masterClrMapping/>
   </p:clrMapOvr>
-  <mc:AlternateContent xmlns:mc="http://schemas.openxmlformats.org/markup-compatibility/2006">
-    <mc:Choice xmlns:p159="http://schemas.microsoft.com/office/powerpoint/2015/09/main" Requires="p159">
+  <mc:AlternateContent xmlns:mc="http://schemas.openxmlformats.org/markup-compatibility/2006" xmlns:p159="http://schemas.microsoft.com/office/powerpoint/2015/09/main">
+    <mc:Choice Requires="p159">
       <p:transition spd="slow">
         <p159:morph option="byObject"/>
       </p:transition>
     </mc:Choice>
-    <mc:Fallback>
+    <mc:Fallback xmlns="">
       <p:transition spd="slow">
         <p:fade/>
       </p:transition>
@@ -9946,13 +10140,13 @@
   <p:clrMapOvr>
     <a:masterClrMapping/>
   </p:clrMapOvr>
-  <mc:AlternateContent xmlns:mc="http://schemas.openxmlformats.org/markup-compatibility/2006">
-    <mc:Choice xmlns:p159="http://schemas.microsoft.com/office/powerpoint/2015/09/main" Requires="p159">
+  <mc:AlternateContent xmlns:mc="http://schemas.openxmlformats.org/markup-compatibility/2006" xmlns:p159="http://schemas.microsoft.com/office/powerpoint/2015/09/main">
+    <mc:Choice Requires="p159">
       <p:transition xmlns:p14="http://schemas.microsoft.com/office/powerpoint/2010/main" spd="med" p14:dur="700">
         <p159:morph option="byObject"/>
       </p:transition>
     </mc:Choice>
-    <mc:Fallback>
+    <mc:Fallback xmlns="">
       <p:transition spd="med">
         <p:fade/>
       </p:transition>
@@ -10749,15 +10943,15 @@
               </a:ext>
             </a:extLst>
           </a:blip>
-          <a:srcRect l="755" r="1245"/>
+          <a:srcRect l="755" t="1678" r="1245" b="932"/>
           <a:stretch>
             <a:fillRect/>
           </a:stretch>
         </p:blipFill>
         <p:spPr>
           <a:xfrm>
-            <a:off x="990600" y="0"/>
-            <a:ext cx="10160000" cy="6858000"/>
+            <a:off x="1190625" y="95250"/>
+            <a:ext cx="9810750" cy="6449416"/>
           </a:xfrm>
           <a:prstGeom prst="rect">
             <a:avLst/>
@@ -10774,13 +10968,13 @@
   <p:clrMapOvr>
     <a:masterClrMapping/>
   </p:clrMapOvr>
-  <mc:AlternateContent xmlns:mc="http://schemas.openxmlformats.org/markup-compatibility/2006">
-    <mc:Choice xmlns:p159="http://schemas.microsoft.com/office/powerpoint/2015/09/main" Requires="p159">
+  <mc:AlternateContent xmlns:mc="http://schemas.openxmlformats.org/markup-compatibility/2006" xmlns:p159="http://schemas.microsoft.com/office/powerpoint/2015/09/main">
+    <mc:Choice Requires="p159">
       <p:transition xmlns:p14="http://schemas.microsoft.com/office/powerpoint/2010/main" spd="med" p14:dur="700">
         <p159:morph option="byObject"/>
       </p:transition>
     </mc:Choice>
-    <mc:Fallback>
+    <mc:Fallback xmlns="">
       <p:transition spd="med">
         <p:fade/>
       </p:transition>
@@ -11212,7 +11406,7 @@
                 </a:solidFill>
                 <a:ea typeface="游ゴシック"/>
               </a:rPr>
-              <a:t>結論</a:t>
+              <a:t>結論と展望</a:t>
             </a:r>
             <a:endParaRPr lang="en-US" altLang="ja-JP" sz="4000" b="1" dirty="0" err="1">
               <a:solidFill>
@@ -11264,7 +11458,7 @@
                 <a:latin typeface="Inter Medium"/>
                 <a:ea typeface="游ゴシック"/>
               </a:rPr>
-              <a:t>Conclusion</a:t>
+              <a:t>Conclusion &amp; Visions</a:t>
             </a:r>
             <a:endParaRPr lang="en-US" dirty="0"/>
           </a:p>
@@ -11459,7 +11653,7 @@
                         <p:par>
                           <p:cTn id="16" fill="hold">
                             <p:stCondLst>
-                              <p:cond delay="161"/>
+                              <p:cond delay="281"/>
                             </p:stCondLst>
                             <p:childTnLst>
                               <p:par>
@@ -11604,7 +11798,7 @@
                   <a:srgbClr val="20567E"/>
                 </a:solidFill>
               </a:rPr>
-              <a:t>結論</a:t>
+              <a:t>結論と展望</a:t>
             </a:r>
             <a:endParaRPr kumimoji="1" lang="en-US" altLang="ja-JP" sz="3200" b="1" dirty="0">
               <a:solidFill>
@@ -12191,13 +12385,259 @@
   <p:clrMapOvr>
     <a:masterClrMapping/>
   </p:clrMapOvr>
-  <mc:AlternateContent xmlns:mc="http://schemas.openxmlformats.org/markup-compatibility/2006">
-    <mc:Choice xmlns:p159="http://schemas.microsoft.com/office/powerpoint/2015/09/main" Requires="p159">
+  <mc:AlternateContent xmlns:mc="http://schemas.openxmlformats.org/markup-compatibility/2006" xmlns:p159="http://schemas.microsoft.com/office/powerpoint/2015/09/main">
+    <mc:Choice Requires="p159">
       <p:transition spd="slow">
         <p159:morph option="byObject"/>
       </p:transition>
     </mc:Choice>
-    <mc:Fallback>
+    <mc:Fallback xmlns="">
+      <p:transition spd="slow">
+        <p:fade/>
+      </p:transition>
+    </mc:Fallback>
+  </mc:AlternateContent>
+</p:sld>
+</file>
+
+<file path=ppt/slides/slide19.xml><?xml version="1.0" encoding="utf-8"?>
+<p:sld xmlns:a="http://schemas.openxmlformats.org/drawingml/2006/main" xmlns:r="http://schemas.openxmlformats.org/officeDocument/2006/relationships" xmlns:p="http://schemas.openxmlformats.org/presentationml/2006/main">
+  <p:cSld>
+    <p:spTree>
+      <p:nvGrpSpPr>
+        <p:cNvPr id="1" name="">
+          <a:extLst>
+            <a:ext uri="{FF2B5EF4-FFF2-40B4-BE49-F238E27FC236}">
+              <a16:creationId xmlns:a16="http://schemas.microsoft.com/office/drawing/2014/main" id="{4AFB4D25-54E4-4E8B-5995-25F921EE3444}"/>
+            </a:ext>
+          </a:extLst>
+        </p:cNvPr>
+        <p:cNvGrpSpPr/>
+        <p:nvPr/>
+      </p:nvGrpSpPr>
+      <p:grpSpPr>
+        <a:xfrm>
+          <a:off x="0" y="0"/>
+          <a:ext cx="0" cy="0"/>
+          <a:chOff x="0" y="0"/>
+          <a:chExt cx="0" cy="0"/>
+        </a:xfrm>
+      </p:grpSpPr>
+      <p:sp>
+        <p:nvSpPr>
+          <p:cNvPr id="2" name="テキスト ボックス 1">
+            <a:extLst>
+              <a:ext uri="{FF2B5EF4-FFF2-40B4-BE49-F238E27FC236}">
+                <a16:creationId xmlns:a16="http://schemas.microsoft.com/office/drawing/2014/main" id="{3A63826E-5A22-8676-519B-FD7988AD21CC}"/>
+              </a:ext>
+            </a:extLst>
+          </p:cNvPr>
+          <p:cNvSpPr txBox="1"/>
+          <p:nvPr/>
+        </p:nvSpPr>
+        <p:spPr>
+          <a:xfrm>
+            <a:off x="333667" y="429476"/>
+            <a:ext cx="3914854" cy="461665"/>
+          </a:xfrm>
+          <a:prstGeom prst="rect">
+            <a:avLst/>
+          </a:prstGeom>
+          <a:noFill/>
+        </p:spPr>
+        <p:txBody>
+          <a:bodyPr wrap="none" rtlCol="0" anchor="ctr">
+            <a:spAutoFit/>
+          </a:bodyPr>
+          <a:lstStyle/>
+          <a:p>
+            <a:r>
+              <a:rPr kumimoji="1" lang="ja-JP" altLang="en-US" sz="2400" b="1" dirty="0">
+                <a:solidFill>
+                  <a:srgbClr val="20567E"/>
+                </a:solidFill>
+                <a:latin typeface="游ゴシック" panose="020B0400000000000000" pitchFamily="50" charset="-128"/>
+                <a:ea typeface="游ゴシック" panose="020B0400000000000000" pitchFamily="50" charset="-128"/>
+              </a:rPr>
+              <a:t>視覚と</a:t>
+            </a:r>
+            <a:r>
+              <a:rPr kumimoji="1" lang="en-US" altLang="ja-JP" sz="2400" b="1" dirty="0">
+                <a:solidFill>
+                  <a:srgbClr val="20567E"/>
+                </a:solidFill>
+                <a:latin typeface="游ゴシック" panose="020B0400000000000000" pitchFamily="50" charset="-128"/>
+                <a:ea typeface="游ゴシック" panose="020B0400000000000000" pitchFamily="50" charset="-128"/>
+              </a:rPr>
+              <a:t>Web</a:t>
+            </a:r>
+            <a:r>
+              <a:rPr kumimoji="1" lang="ja-JP" altLang="en-US" sz="2400" b="1" dirty="0">
+                <a:solidFill>
+                  <a:srgbClr val="20567E"/>
+                </a:solidFill>
+                <a:latin typeface="游ゴシック" panose="020B0400000000000000" pitchFamily="50" charset="-128"/>
+                <a:ea typeface="游ゴシック" panose="020B0400000000000000" pitchFamily="50" charset="-128"/>
+              </a:rPr>
+              <a:t>デザインの関係</a:t>
+            </a:r>
+            <a:endParaRPr kumimoji="1" lang="en-US" altLang="ja-JP" sz="2400" b="1" dirty="0">
+              <a:solidFill>
+                <a:srgbClr val="20567E"/>
+              </a:solidFill>
+              <a:latin typeface="游ゴシック" panose="020B0400000000000000" pitchFamily="50" charset="-128"/>
+              <a:ea typeface="游ゴシック" panose="020B0400000000000000" pitchFamily="50" charset="-128"/>
+            </a:endParaRPr>
+          </a:p>
+        </p:txBody>
+      </p:sp>
+      <p:sp>
+        <p:nvSpPr>
+          <p:cNvPr id="6" name="テキスト ボックス 5">
+            <a:extLst>
+              <a:ext uri="{FF2B5EF4-FFF2-40B4-BE49-F238E27FC236}">
+                <a16:creationId xmlns:a16="http://schemas.microsoft.com/office/drawing/2014/main" id="{E8A21C29-53D9-36C1-357F-D43C9589FCA7}"/>
+              </a:ext>
+            </a:extLst>
+          </p:cNvPr>
+          <p:cNvSpPr txBox="1"/>
+          <p:nvPr/>
+        </p:nvSpPr>
+        <p:spPr>
+          <a:xfrm>
+            <a:off x="333667" y="1031952"/>
+            <a:ext cx="3698448" cy="307777"/>
+          </a:xfrm>
+          <a:prstGeom prst="rect">
+            <a:avLst/>
+          </a:prstGeom>
+          <a:noFill/>
+        </p:spPr>
+        <p:txBody>
+          <a:bodyPr wrap="none" rtlCol="0">
+            <a:spAutoFit/>
+          </a:bodyPr>
+          <a:lstStyle/>
+          <a:p>
+            <a:r>
+              <a:rPr kumimoji="1" lang="ja-JP" altLang="en-US" sz="1400" dirty="0">
+                <a:solidFill>
+                  <a:srgbClr val="202028"/>
+                </a:solidFill>
+                <a:latin typeface="游ゴシック Medium" panose="020B0500000000000000" pitchFamily="50" charset="-128"/>
+                <a:ea typeface="游ゴシック Medium" panose="020B0500000000000000" pitchFamily="50" charset="-128"/>
+              </a:rPr>
+              <a:t>グループ</a:t>
+            </a:r>
+            <a:r>
+              <a:rPr kumimoji="1" lang="en-US" altLang="ja-JP" sz="1400" dirty="0">
+                <a:solidFill>
+                  <a:srgbClr val="202028"/>
+                </a:solidFill>
+                <a:latin typeface="游ゴシック Medium" panose="020B0500000000000000" pitchFamily="50" charset="-128"/>
+                <a:ea typeface="游ゴシック Medium" panose="020B0500000000000000" pitchFamily="50" charset="-128"/>
+              </a:rPr>
+              <a:t>18 | 3G - </a:t>
+            </a:r>
+            <a:r>
+              <a:rPr kumimoji="1" lang="ja-JP" altLang="en-US" sz="1400" dirty="0">
+                <a:solidFill>
+                  <a:srgbClr val="202028"/>
+                </a:solidFill>
+                <a:latin typeface="游ゴシック Medium" panose="020B0500000000000000" pitchFamily="50" charset="-128"/>
+                <a:ea typeface="游ゴシック Medium" panose="020B0500000000000000" pitchFamily="50" charset="-128"/>
+              </a:rPr>
+              <a:t>寺田侑史・</a:t>
+            </a:r>
+            <a:r>
+              <a:rPr kumimoji="1" lang="en-US" altLang="ja-JP" sz="1400" dirty="0">
+                <a:solidFill>
+                  <a:srgbClr val="202028"/>
+                </a:solidFill>
+                <a:latin typeface="游ゴシック Medium" panose="020B0500000000000000" pitchFamily="50" charset="-128"/>
+                <a:ea typeface="游ゴシック Medium" panose="020B0500000000000000" pitchFamily="50" charset="-128"/>
+              </a:rPr>
+              <a:t>3F – </a:t>
+            </a:r>
+            <a:r>
+              <a:rPr kumimoji="1" lang="ja-JP" altLang="en-US" sz="1400" dirty="0">
+                <a:solidFill>
+                  <a:srgbClr val="202028"/>
+                </a:solidFill>
+                <a:latin typeface="游ゴシック Medium" panose="020B0500000000000000" pitchFamily="50" charset="-128"/>
+                <a:ea typeface="游ゴシック Medium" panose="020B0500000000000000" pitchFamily="50" charset="-128"/>
+              </a:rPr>
+              <a:t>安部律希</a:t>
+            </a:r>
+          </a:p>
+        </p:txBody>
+      </p:sp>
+      <p:sp>
+        <p:nvSpPr>
+          <p:cNvPr id="7" name="テキスト ボックス 6">
+            <a:extLst>
+              <a:ext uri="{FF2B5EF4-FFF2-40B4-BE49-F238E27FC236}">
+                <a16:creationId xmlns:a16="http://schemas.microsoft.com/office/drawing/2014/main" id="{5E50BD68-B998-0FAA-BA00-A3BCC35A000A}"/>
+              </a:ext>
+            </a:extLst>
+          </p:cNvPr>
+          <p:cNvSpPr txBox="1"/>
+          <p:nvPr/>
+        </p:nvSpPr>
+        <p:spPr>
+          <a:xfrm>
+            <a:off x="3695342" y="3198167"/>
+            <a:ext cx="4801315" cy="461665"/>
+          </a:xfrm>
+          <a:prstGeom prst="rect">
+            <a:avLst/>
+          </a:prstGeom>
+          <a:noFill/>
+        </p:spPr>
+        <p:txBody>
+          <a:bodyPr wrap="none" rtlCol="0" anchor="ctr">
+            <a:spAutoFit/>
+          </a:bodyPr>
+          <a:lstStyle/>
+          <a:p>
+            <a:pPr algn="ctr"/>
+            <a:r>
+              <a:rPr kumimoji="1" lang="ja-JP" altLang="en-US" sz="2400" b="1" dirty="0">
+                <a:solidFill>
+                  <a:srgbClr val="202028"/>
+                </a:solidFill>
+                <a:latin typeface="游ゴシック" panose="020B0400000000000000" pitchFamily="50" charset="-128"/>
+                <a:ea typeface="游ゴシック" panose="020B0400000000000000" pitchFamily="50" charset="-128"/>
+              </a:rPr>
+              <a:t>ご清聴ありがとうございました。</a:t>
+            </a:r>
+            <a:endParaRPr kumimoji="1" lang="en-US" altLang="ja-JP" sz="2400" b="1" dirty="0">
+              <a:solidFill>
+                <a:srgbClr val="202028"/>
+              </a:solidFill>
+              <a:latin typeface="游ゴシック" panose="020B0400000000000000" pitchFamily="50" charset="-128"/>
+              <a:ea typeface="游ゴシック" panose="020B0400000000000000" pitchFamily="50" charset="-128"/>
+            </a:endParaRPr>
+          </a:p>
+        </p:txBody>
+      </p:sp>
+    </p:spTree>
+    <p:extLst>
+      <p:ext uri="{BB962C8B-B14F-4D97-AF65-F5344CB8AC3E}">
+        <p14:creationId xmlns:p14="http://schemas.microsoft.com/office/powerpoint/2010/main" val="337892287"/>
+      </p:ext>
+    </p:extLst>
+  </p:cSld>
+  <p:clrMapOvr>
+    <a:masterClrMapping/>
+  </p:clrMapOvr>
+  <mc:AlternateContent xmlns:mc="http://schemas.openxmlformats.org/markup-compatibility/2006" xmlns:p159="http://schemas.microsoft.com/office/powerpoint/2015/09/main">
+    <mc:Choice Requires="p159">
+      <p:transition spd="slow">
+        <p159:morph option="byObject"/>
+      </p:transition>
+    </mc:Choice>
+    <mc:Fallback xmlns="">
       <p:transition spd="slow">
         <p:fade/>
       </p:transition>
@@ -12706,13 +13146,13 @@
   <p:clrMapOvr>
     <a:masterClrMapping/>
   </p:clrMapOvr>
-  <mc:AlternateContent xmlns:mc="http://schemas.openxmlformats.org/markup-compatibility/2006">
-    <mc:Choice xmlns:p14="http://schemas.microsoft.com/office/powerpoint/2010/main" Requires="p14">
+  <mc:AlternateContent xmlns:mc="http://schemas.openxmlformats.org/markup-compatibility/2006" xmlns:p14="http://schemas.microsoft.com/office/powerpoint/2010/main">
+    <mc:Choice Requires="p14">
       <p:transition spd="med" p14:dur="700">
         <p:fade/>
       </p:transition>
     </mc:Choice>
-    <mc:Fallback>
+    <mc:Fallback xmlns="">
       <p:transition spd="med">
         <p:fade/>
       </p:transition>
@@ -12956,6 +13396,827 @@
 </p:sld>
 </file>
 
+<file path=ppt/slides/slide20.xml><?xml version="1.0" encoding="utf-8"?>
+<p:sld xmlns:a="http://schemas.openxmlformats.org/drawingml/2006/main" xmlns:r="http://schemas.openxmlformats.org/officeDocument/2006/relationships" xmlns:p="http://schemas.openxmlformats.org/presentationml/2006/main">
+  <p:cSld>
+    <p:spTree>
+      <p:nvGrpSpPr>
+        <p:cNvPr id="1" name="">
+          <a:extLst>
+            <a:ext uri="{FF2B5EF4-FFF2-40B4-BE49-F238E27FC236}">
+              <a16:creationId xmlns:a16="http://schemas.microsoft.com/office/drawing/2014/main" id="{E3B41B23-BBAA-F9EA-4BD4-532944C5A5EC}"/>
+            </a:ext>
+          </a:extLst>
+        </p:cNvPr>
+        <p:cNvGrpSpPr/>
+        <p:nvPr/>
+      </p:nvGrpSpPr>
+      <p:grpSpPr>
+        <a:xfrm>
+          <a:off x="0" y="0"/>
+          <a:ext cx="0" cy="0"/>
+          <a:chOff x="0" y="0"/>
+          <a:chExt cx="0" cy="0"/>
+        </a:xfrm>
+      </p:grpSpPr>
+      <p:pic>
+        <p:nvPicPr>
+          <p:cNvPr id="26" name="図 25">
+            <a:extLst>
+              <a:ext uri="{FF2B5EF4-FFF2-40B4-BE49-F238E27FC236}">
+                <a16:creationId xmlns:a16="http://schemas.microsoft.com/office/drawing/2014/main" id="{49B5F6F8-1D6E-9E08-9FE5-2D14CE850E34}"/>
+              </a:ext>
+            </a:extLst>
+          </p:cNvPr>
+          <p:cNvPicPr>
+            <a:picLocks noChangeAspect="1"/>
+          </p:cNvPicPr>
+          <p:nvPr/>
+        </p:nvPicPr>
+        <p:blipFill>
+          <a:blip r:embed="rId3">
+            <a:extLst>
+              <a:ext uri="{28A0092B-C50C-407E-A947-70E740481C1C}">
+                <a14:useLocalDpi xmlns:a14="http://schemas.microsoft.com/office/drawing/2010/main" val="0"/>
+              </a:ext>
+            </a:extLst>
+          </a:blip>
+          <a:srcRect l="-6843" r="-13901"/>
+          <a:stretch/>
+        </p:blipFill>
+        <p:spPr>
+          <a:xfrm>
+            <a:off x="3869267" y="0"/>
+            <a:ext cx="11040533" cy="6858000"/>
+          </a:xfrm>
+          <a:prstGeom prst="rect">
+            <a:avLst/>
+          </a:prstGeom>
+        </p:spPr>
+      </p:pic>
+      <p:sp>
+        <p:nvSpPr>
+          <p:cNvPr id="27" name="フリーフォーム: 図形 26">
+            <a:extLst>
+              <a:ext uri="{FF2B5EF4-FFF2-40B4-BE49-F238E27FC236}">
+                <a16:creationId xmlns:a16="http://schemas.microsoft.com/office/drawing/2014/main" id="{F0DFFC6F-C718-6E66-CDFA-B352138E768A}"/>
+              </a:ext>
+            </a:extLst>
+          </p:cNvPr>
+          <p:cNvSpPr/>
+          <p:nvPr/>
+        </p:nvSpPr>
+        <p:spPr>
+          <a:xfrm>
+            <a:off x="1" y="-1423987"/>
+            <a:ext cx="14050937" cy="9850160"/>
+          </a:xfrm>
+          <a:custGeom>
+            <a:avLst/>
+            <a:gdLst>
+              <a:gd name="connsiteX0" fmla="*/ 7206671 w 14050937"/>
+              <a:gd name="connsiteY0" fmla="*/ 8273520 h 9850160"/>
+              <a:gd name="connsiteX1" fmla="*/ 10579099 w 14050937"/>
+              <a:gd name="connsiteY1" fmla="*/ 8273520 h 9850160"/>
+              <a:gd name="connsiteX2" fmla="*/ 10579099 w 14050937"/>
+              <a:gd name="connsiteY2" fmla="*/ 8876628 h 9850160"/>
+              <a:gd name="connsiteX3" fmla="*/ 8892887 w 14050937"/>
+              <a:gd name="connsiteY3" fmla="*/ 9850160 h 9850160"/>
+              <a:gd name="connsiteX4" fmla="*/ 7206671 w 14050937"/>
+              <a:gd name="connsiteY4" fmla="*/ 8876624 h 9850160"/>
+              <a:gd name="connsiteX5" fmla="*/ 12364725 w 14050937"/>
+              <a:gd name="connsiteY5" fmla="*/ 5956016 h 9850160"/>
+              <a:gd name="connsiteX6" fmla="*/ 14050937 w 14050937"/>
+              <a:gd name="connsiteY6" fmla="*/ 6929549 h 9850160"/>
+              <a:gd name="connsiteX7" fmla="*/ 14050937 w 14050937"/>
+              <a:gd name="connsiteY7" fmla="*/ 8876628 h 9850160"/>
+              <a:gd name="connsiteX8" fmla="*/ 12364725 w 14050937"/>
+              <a:gd name="connsiteY8" fmla="*/ 9850160 h 9850160"/>
+              <a:gd name="connsiteX9" fmla="*/ 10678509 w 14050937"/>
+              <a:gd name="connsiteY9" fmla="*/ 8876624 h 9850160"/>
+              <a:gd name="connsiteX10" fmla="*/ 10678509 w 14050937"/>
+              <a:gd name="connsiteY10" fmla="*/ 8273520 h 9850160"/>
+              <a:gd name="connsiteX11" fmla="*/ 12191999 w 14050937"/>
+              <a:gd name="connsiteY11" fmla="*/ 8273520 h 9850160"/>
+              <a:gd name="connsiteX12" fmla="*/ 12191999 w 14050937"/>
+              <a:gd name="connsiteY12" fmla="*/ 6055740 h 9850160"/>
+              <a:gd name="connsiteX13" fmla="*/ 12191999 w 14050937"/>
+              <a:gd name="connsiteY13" fmla="*/ 3882479 h 9850160"/>
+              <a:gd name="connsiteX14" fmla="*/ 12311618 w 14050937"/>
+              <a:gd name="connsiteY14" fmla="*/ 3951541 h 9850160"/>
+              <a:gd name="connsiteX15" fmla="*/ 12311618 w 14050937"/>
+              <a:gd name="connsiteY15" fmla="*/ 5898620 h 9850160"/>
+              <a:gd name="connsiteX16" fmla="*/ 12191999 w 14050937"/>
+              <a:gd name="connsiteY16" fmla="*/ 5967682 h 9850160"/>
+              <a:gd name="connsiteX17" fmla="*/ 0 w 14050937"/>
+              <a:gd name="connsiteY17" fmla="*/ 1415521 h 9850160"/>
+              <a:gd name="connsiteX18" fmla="*/ 7206671 w 14050937"/>
+              <a:gd name="connsiteY18" fmla="*/ 1415521 h 9850160"/>
+              <a:gd name="connsiteX19" fmla="*/ 7206671 w 14050937"/>
+              <a:gd name="connsiteY19" fmla="*/ 2920609 h 9850160"/>
+              <a:gd name="connsiteX20" fmla="*/ 8892887 w 14050937"/>
+              <a:gd name="connsiteY20" fmla="*/ 3894145 h 9850160"/>
+              <a:gd name="connsiteX21" fmla="*/ 10579099 w 14050937"/>
+              <a:gd name="connsiteY21" fmla="*/ 2920612 h 9850160"/>
+              <a:gd name="connsiteX22" fmla="*/ 10579099 w 14050937"/>
+              <a:gd name="connsiteY22" fmla="*/ 1415521 h 9850160"/>
+              <a:gd name="connsiteX23" fmla="*/ 10671708 w 14050937"/>
+              <a:gd name="connsiteY23" fmla="*/ 1415521 h 9850160"/>
+              <a:gd name="connsiteX24" fmla="*/ 10671708 w 14050937"/>
+              <a:gd name="connsiteY24" fmla="*/ 2920609 h 9850160"/>
+              <a:gd name="connsiteX25" fmla="*/ 12191999 w 14050937"/>
+              <a:gd name="connsiteY25" fmla="*/ 3798348 h 9850160"/>
+              <a:gd name="connsiteX26" fmla="*/ 12191999 w 14050937"/>
+              <a:gd name="connsiteY26" fmla="*/ 3882479 h 9850160"/>
+              <a:gd name="connsiteX27" fmla="*/ 10625406 w 14050937"/>
+              <a:gd name="connsiteY27" fmla="*/ 2978008 h 9850160"/>
+              <a:gd name="connsiteX28" fmla="*/ 8939190 w 14050937"/>
+              <a:gd name="connsiteY28" fmla="*/ 3951545 h 9850160"/>
+              <a:gd name="connsiteX29" fmla="*/ 8939190 w 14050937"/>
+              <a:gd name="connsiteY29" fmla="*/ 5898616 h 9850160"/>
+              <a:gd name="connsiteX30" fmla="*/ 10625406 w 14050937"/>
+              <a:gd name="connsiteY30" fmla="*/ 6872152 h 9850160"/>
+              <a:gd name="connsiteX31" fmla="*/ 12191999 w 14050937"/>
+              <a:gd name="connsiteY31" fmla="*/ 5967682 h 9850160"/>
+              <a:gd name="connsiteX32" fmla="*/ 12191999 w 14050937"/>
+              <a:gd name="connsiteY32" fmla="*/ 6055740 h 9850160"/>
+              <a:gd name="connsiteX33" fmla="*/ 10678509 w 14050937"/>
+              <a:gd name="connsiteY33" fmla="*/ 6929552 h 9850160"/>
+              <a:gd name="connsiteX34" fmla="*/ 10678509 w 14050937"/>
+              <a:gd name="connsiteY34" fmla="*/ 8273520 h 9850160"/>
+              <a:gd name="connsiteX35" fmla="*/ 10579099 w 14050937"/>
+              <a:gd name="connsiteY35" fmla="*/ 8273520 h 9850160"/>
+              <a:gd name="connsiteX36" fmla="*/ 10579099 w 14050937"/>
+              <a:gd name="connsiteY36" fmla="*/ 6929549 h 9850160"/>
+              <a:gd name="connsiteX37" fmla="*/ 8892887 w 14050937"/>
+              <a:gd name="connsiteY37" fmla="*/ 5956016 h 9850160"/>
+              <a:gd name="connsiteX38" fmla="*/ 7206671 w 14050937"/>
+              <a:gd name="connsiteY38" fmla="*/ 6929552 h 9850160"/>
+              <a:gd name="connsiteX39" fmla="*/ 7206671 w 14050937"/>
+              <a:gd name="connsiteY39" fmla="*/ 8273520 h 9850160"/>
+              <a:gd name="connsiteX40" fmla="*/ 0 w 14050937"/>
+              <a:gd name="connsiteY40" fmla="*/ 8273520 h 9850160"/>
+              <a:gd name="connsiteX41" fmla="*/ 8892887 w 14050937"/>
+              <a:gd name="connsiteY41" fmla="*/ 1 h 9850160"/>
+              <a:gd name="connsiteX42" fmla="*/ 10579099 w 14050937"/>
+              <a:gd name="connsiteY42" fmla="*/ 973533 h 9850160"/>
+              <a:gd name="connsiteX43" fmla="*/ 10579099 w 14050937"/>
+              <a:gd name="connsiteY43" fmla="*/ 1415521 h 9850160"/>
+              <a:gd name="connsiteX44" fmla="*/ 7206671 w 14050937"/>
+              <a:gd name="connsiteY44" fmla="*/ 1415521 h 9850160"/>
+              <a:gd name="connsiteX45" fmla="*/ 7206671 w 14050937"/>
+              <a:gd name="connsiteY45" fmla="*/ 973537 h 9850160"/>
+              <a:gd name="connsiteX46" fmla="*/ 12357924 w 14050937"/>
+              <a:gd name="connsiteY46" fmla="*/ 0 h 9850160"/>
+              <a:gd name="connsiteX47" fmla="*/ 14044136 w 14050937"/>
+              <a:gd name="connsiteY47" fmla="*/ 973533 h 9850160"/>
+              <a:gd name="connsiteX48" fmla="*/ 14044136 w 14050937"/>
+              <a:gd name="connsiteY48" fmla="*/ 2920612 h 9850160"/>
+              <a:gd name="connsiteX49" fmla="*/ 12357924 w 14050937"/>
+              <a:gd name="connsiteY49" fmla="*/ 3894145 h 9850160"/>
+              <a:gd name="connsiteX50" fmla="*/ 12191999 w 14050937"/>
+              <a:gd name="connsiteY50" fmla="*/ 3798348 h 9850160"/>
+              <a:gd name="connsiteX51" fmla="*/ 12191999 w 14050937"/>
+              <a:gd name="connsiteY51" fmla="*/ 1415521 h 9850160"/>
+              <a:gd name="connsiteX52" fmla="*/ 10671708 w 14050937"/>
+              <a:gd name="connsiteY52" fmla="*/ 1415521 h 9850160"/>
+              <a:gd name="connsiteX53" fmla="*/ 10671708 w 14050937"/>
+              <a:gd name="connsiteY53" fmla="*/ 973537 h 9850160"/>
+            </a:gdLst>
+            <a:ahLst/>
+            <a:cxnLst>
+              <a:cxn ang="0">
+                <a:pos x="connsiteX0" y="connsiteY0"/>
+              </a:cxn>
+              <a:cxn ang="0">
+                <a:pos x="connsiteX1" y="connsiteY1"/>
+              </a:cxn>
+              <a:cxn ang="0">
+                <a:pos x="connsiteX2" y="connsiteY2"/>
+              </a:cxn>
+              <a:cxn ang="0">
+                <a:pos x="connsiteX3" y="connsiteY3"/>
+              </a:cxn>
+              <a:cxn ang="0">
+                <a:pos x="connsiteX4" y="connsiteY4"/>
+              </a:cxn>
+              <a:cxn ang="0">
+                <a:pos x="connsiteX5" y="connsiteY5"/>
+              </a:cxn>
+              <a:cxn ang="0">
+                <a:pos x="connsiteX6" y="connsiteY6"/>
+              </a:cxn>
+              <a:cxn ang="0">
+                <a:pos x="connsiteX7" y="connsiteY7"/>
+              </a:cxn>
+              <a:cxn ang="0">
+                <a:pos x="connsiteX8" y="connsiteY8"/>
+              </a:cxn>
+              <a:cxn ang="0">
+                <a:pos x="connsiteX9" y="connsiteY9"/>
+              </a:cxn>
+              <a:cxn ang="0">
+                <a:pos x="connsiteX10" y="connsiteY10"/>
+              </a:cxn>
+              <a:cxn ang="0">
+                <a:pos x="connsiteX11" y="connsiteY11"/>
+              </a:cxn>
+              <a:cxn ang="0">
+                <a:pos x="connsiteX12" y="connsiteY12"/>
+              </a:cxn>
+              <a:cxn ang="0">
+                <a:pos x="connsiteX13" y="connsiteY13"/>
+              </a:cxn>
+              <a:cxn ang="0">
+                <a:pos x="connsiteX14" y="connsiteY14"/>
+              </a:cxn>
+              <a:cxn ang="0">
+                <a:pos x="connsiteX15" y="connsiteY15"/>
+              </a:cxn>
+              <a:cxn ang="0">
+                <a:pos x="connsiteX16" y="connsiteY16"/>
+              </a:cxn>
+              <a:cxn ang="0">
+                <a:pos x="connsiteX17" y="connsiteY17"/>
+              </a:cxn>
+              <a:cxn ang="0">
+                <a:pos x="connsiteX18" y="connsiteY18"/>
+              </a:cxn>
+              <a:cxn ang="0">
+                <a:pos x="connsiteX19" y="connsiteY19"/>
+              </a:cxn>
+              <a:cxn ang="0">
+                <a:pos x="connsiteX20" y="connsiteY20"/>
+              </a:cxn>
+              <a:cxn ang="0">
+                <a:pos x="connsiteX21" y="connsiteY21"/>
+              </a:cxn>
+              <a:cxn ang="0">
+                <a:pos x="connsiteX22" y="connsiteY22"/>
+              </a:cxn>
+              <a:cxn ang="0">
+                <a:pos x="connsiteX23" y="connsiteY23"/>
+              </a:cxn>
+              <a:cxn ang="0">
+                <a:pos x="connsiteX24" y="connsiteY24"/>
+              </a:cxn>
+              <a:cxn ang="0">
+                <a:pos x="connsiteX25" y="connsiteY25"/>
+              </a:cxn>
+              <a:cxn ang="0">
+                <a:pos x="connsiteX26" y="connsiteY26"/>
+              </a:cxn>
+              <a:cxn ang="0">
+                <a:pos x="connsiteX27" y="connsiteY27"/>
+              </a:cxn>
+              <a:cxn ang="0">
+                <a:pos x="connsiteX28" y="connsiteY28"/>
+              </a:cxn>
+              <a:cxn ang="0">
+                <a:pos x="connsiteX29" y="connsiteY29"/>
+              </a:cxn>
+              <a:cxn ang="0">
+                <a:pos x="connsiteX30" y="connsiteY30"/>
+              </a:cxn>
+              <a:cxn ang="0">
+                <a:pos x="connsiteX31" y="connsiteY31"/>
+              </a:cxn>
+              <a:cxn ang="0">
+                <a:pos x="connsiteX32" y="connsiteY32"/>
+              </a:cxn>
+              <a:cxn ang="0">
+                <a:pos x="connsiteX33" y="connsiteY33"/>
+              </a:cxn>
+              <a:cxn ang="0">
+                <a:pos x="connsiteX34" y="connsiteY34"/>
+              </a:cxn>
+              <a:cxn ang="0">
+                <a:pos x="connsiteX35" y="connsiteY35"/>
+              </a:cxn>
+              <a:cxn ang="0">
+                <a:pos x="connsiteX36" y="connsiteY36"/>
+              </a:cxn>
+              <a:cxn ang="0">
+                <a:pos x="connsiteX37" y="connsiteY37"/>
+              </a:cxn>
+              <a:cxn ang="0">
+                <a:pos x="connsiteX38" y="connsiteY38"/>
+              </a:cxn>
+              <a:cxn ang="0">
+                <a:pos x="connsiteX39" y="connsiteY39"/>
+              </a:cxn>
+              <a:cxn ang="0">
+                <a:pos x="connsiteX40" y="connsiteY40"/>
+              </a:cxn>
+              <a:cxn ang="0">
+                <a:pos x="connsiteX41" y="connsiteY41"/>
+              </a:cxn>
+              <a:cxn ang="0">
+                <a:pos x="connsiteX42" y="connsiteY42"/>
+              </a:cxn>
+              <a:cxn ang="0">
+                <a:pos x="connsiteX43" y="connsiteY43"/>
+              </a:cxn>
+              <a:cxn ang="0">
+                <a:pos x="connsiteX44" y="connsiteY44"/>
+              </a:cxn>
+              <a:cxn ang="0">
+                <a:pos x="connsiteX45" y="connsiteY45"/>
+              </a:cxn>
+              <a:cxn ang="0">
+                <a:pos x="connsiteX46" y="connsiteY46"/>
+              </a:cxn>
+              <a:cxn ang="0">
+                <a:pos x="connsiteX47" y="connsiteY47"/>
+              </a:cxn>
+              <a:cxn ang="0">
+                <a:pos x="connsiteX48" y="connsiteY48"/>
+              </a:cxn>
+              <a:cxn ang="0">
+                <a:pos x="connsiteX49" y="connsiteY49"/>
+              </a:cxn>
+              <a:cxn ang="0">
+                <a:pos x="connsiteX50" y="connsiteY50"/>
+              </a:cxn>
+              <a:cxn ang="0">
+                <a:pos x="connsiteX51" y="connsiteY51"/>
+              </a:cxn>
+              <a:cxn ang="0">
+                <a:pos x="connsiteX52" y="connsiteY52"/>
+              </a:cxn>
+              <a:cxn ang="0">
+                <a:pos x="connsiteX53" y="connsiteY53"/>
+              </a:cxn>
+            </a:cxnLst>
+            <a:rect l="l" t="t" r="r" b="b"/>
+            <a:pathLst>
+              <a:path w="14050937" h="9850160">
+                <a:moveTo>
+                  <a:pt x="7206671" y="8273520"/>
+                </a:moveTo>
+                <a:lnTo>
+                  <a:pt x="10579099" y="8273520"/>
+                </a:lnTo>
+                <a:lnTo>
+                  <a:pt x="10579099" y="8876628"/>
+                </a:lnTo>
+                <a:lnTo>
+                  <a:pt x="8892887" y="9850160"/>
+                </a:lnTo>
+                <a:lnTo>
+                  <a:pt x="7206671" y="8876624"/>
+                </a:lnTo>
+                <a:close/>
+                <a:moveTo>
+                  <a:pt x="12364725" y="5956016"/>
+                </a:moveTo>
+                <a:lnTo>
+                  <a:pt x="14050937" y="6929549"/>
+                </a:lnTo>
+                <a:lnTo>
+                  <a:pt x="14050937" y="8876628"/>
+                </a:lnTo>
+                <a:lnTo>
+                  <a:pt x="12364725" y="9850160"/>
+                </a:lnTo>
+                <a:lnTo>
+                  <a:pt x="10678509" y="8876624"/>
+                </a:lnTo>
+                <a:lnTo>
+                  <a:pt x="10678509" y="8273520"/>
+                </a:lnTo>
+                <a:lnTo>
+                  <a:pt x="12191999" y="8273520"/>
+                </a:lnTo>
+                <a:lnTo>
+                  <a:pt x="12191999" y="6055740"/>
+                </a:lnTo>
+                <a:close/>
+                <a:moveTo>
+                  <a:pt x="12191999" y="3882479"/>
+                </a:moveTo>
+                <a:lnTo>
+                  <a:pt x="12311618" y="3951541"/>
+                </a:lnTo>
+                <a:lnTo>
+                  <a:pt x="12311618" y="5898620"/>
+                </a:lnTo>
+                <a:lnTo>
+                  <a:pt x="12191999" y="5967682"/>
+                </a:lnTo>
+                <a:close/>
+                <a:moveTo>
+                  <a:pt x="0" y="1415521"/>
+                </a:moveTo>
+                <a:lnTo>
+                  <a:pt x="7206671" y="1415521"/>
+                </a:lnTo>
+                <a:lnTo>
+                  <a:pt x="7206671" y="2920609"/>
+                </a:lnTo>
+                <a:lnTo>
+                  <a:pt x="8892887" y="3894145"/>
+                </a:lnTo>
+                <a:lnTo>
+                  <a:pt x="10579099" y="2920612"/>
+                </a:lnTo>
+                <a:lnTo>
+                  <a:pt x="10579099" y="1415521"/>
+                </a:lnTo>
+                <a:lnTo>
+                  <a:pt x="10671708" y="1415521"/>
+                </a:lnTo>
+                <a:lnTo>
+                  <a:pt x="10671708" y="2920609"/>
+                </a:lnTo>
+                <a:lnTo>
+                  <a:pt x="12191999" y="3798348"/>
+                </a:lnTo>
+                <a:lnTo>
+                  <a:pt x="12191999" y="3882479"/>
+                </a:lnTo>
+                <a:lnTo>
+                  <a:pt x="10625406" y="2978008"/>
+                </a:lnTo>
+                <a:lnTo>
+                  <a:pt x="8939190" y="3951545"/>
+                </a:lnTo>
+                <a:lnTo>
+                  <a:pt x="8939190" y="5898616"/>
+                </a:lnTo>
+                <a:lnTo>
+                  <a:pt x="10625406" y="6872152"/>
+                </a:lnTo>
+                <a:lnTo>
+                  <a:pt x="12191999" y="5967682"/>
+                </a:lnTo>
+                <a:lnTo>
+                  <a:pt x="12191999" y="6055740"/>
+                </a:lnTo>
+                <a:lnTo>
+                  <a:pt x="10678509" y="6929552"/>
+                </a:lnTo>
+                <a:lnTo>
+                  <a:pt x="10678509" y="8273520"/>
+                </a:lnTo>
+                <a:lnTo>
+                  <a:pt x="10579099" y="8273520"/>
+                </a:lnTo>
+                <a:lnTo>
+                  <a:pt x="10579099" y="6929549"/>
+                </a:lnTo>
+                <a:lnTo>
+                  <a:pt x="8892887" y="5956016"/>
+                </a:lnTo>
+                <a:lnTo>
+                  <a:pt x="7206671" y="6929552"/>
+                </a:lnTo>
+                <a:lnTo>
+                  <a:pt x="7206671" y="8273520"/>
+                </a:lnTo>
+                <a:lnTo>
+                  <a:pt x="0" y="8273520"/>
+                </a:lnTo>
+                <a:close/>
+                <a:moveTo>
+                  <a:pt x="8892887" y="1"/>
+                </a:moveTo>
+                <a:lnTo>
+                  <a:pt x="10579099" y="973533"/>
+                </a:lnTo>
+                <a:lnTo>
+                  <a:pt x="10579099" y="1415521"/>
+                </a:lnTo>
+                <a:lnTo>
+                  <a:pt x="7206671" y="1415521"/>
+                </a:lnTo>
+                <a:lnTo>
+                  <a:pt x="7206671" y="973537"/>
+                </a:lnTo>
+                <a:close/>
+                <a:moveTo>
+                  <a:pt x="12357924" y="0"/>
+                </a:moveTo>
+                <a:lnTo>
+                  <a:pt x="14044136" y="973533"/>
+                </a:lnTo>
+                <a:lnTo>
+                  <a:pt x="14044136" y="2920612"/>
+                </a:lnTo>
+                <a:lnTo>
+                  <a:pt x="12357924" y="3894145"/>
+                </a:lnTo>
+                <a:lnTo>
+                  <a:pt x="12191999" y="3798348"/>
+                </a:lnTo>
+                <a:lnTo>
+                  <a:pt x="12191999" y="1415521"/>
+                </a:lnTo>
+                <a:lnTo>
+                  <a:pt x="10671708" y="1415521"/>
+                </a:lnTo>
+                <a:lnTo>
+                  <a:pt x="10671708" y="973537"/>
+                </a:lnTo>
+                <a:close/>
+              </a:path>
+            </a:pathLst>
+          </a:custGeom>
+          <a:solidFill>
+            <a:srgbClr val="FAFAFA"/>
+          </a:solidFill>
+          <a:ln>
+            <a:noFill/>
+          </a:ln>
+        </p:spPr>
+        <p:style>
+          <a:lnRef idx="2">
+            <a:schemeClr val="accent1">
+              <a:shade val="15000"/>
+            </a:schemeClr>
+          </a:lnRef>
+          <a:fillRef idx="1">
+            <a:schemeClr val="accent1"/>
+          </a:fillRef>
+          <a:effectRef idx="0">
+            <a:schemeClr val="accent1"/>
+          </a:effectRef>
+          <a:fontRef idx="minor">
+            <a:schemeClr val="lt1"/>
+          </a:fontRef>
+        </p:style>
+        <p:txBody>
+          <a:bodyPr wrap="square" rtlCol="0" anchor="ctr">
+            <a:noAutofit/>
+          </a:bodyPr>
+          <a:lstStyle/>
+          <a:p>
+            <a:pPr algn="ctr"/>
+            <a:endParaRPr kumimoji="1" lang="ja-JP" altLang="en-US">
+              <a:solidFill>
+                <a:srgbClr val="0876BA"/>
+              </a:solidFill>
+            </a:endParaRPr>
+          </a:p>
+        </p:txBody>
+      </p:sp>
+      <p:sp>
+        <p:nvSpPr>
+          <p:cNvPr id="8" name="テキスト ボックス 7">
+            <a:extLst>
+              <a:ext uri="{FF2B5EF4-FFF2-40B4-BE49-F238E27FC236}">
+                <a16:creationId xmlns:a16="http://schemas.microsoft.com/office/drawing/2014/main" id="{98626059-E740-929F-676B-E33FCAB09F6E}"/>
+              </a:ext>
+            </a:extLst>
+          </p:cNvPr>
+          <p:cNvSpPr txBox="1"/>
+          <p:nvPr/>
+        </p:nvSpPr>
+        <p:spPr>
+          <a:xfrm>
+            <a:off x="1057567" y="2889841"/>
+            <a:ext cx="6732933" cy="707886"/>
+          </a:xfrm>
+          <a:prstGeom prst="rect">
+            <a:avLst/>
+          </a:prstGeom>
+          <a:noFill/>
+        </p:spPr>
+        <p:txBody>
+          <a:bodyPr wrap="none" rtlCol="0" anchor="ctr">
+            <a:spAutoFit/>
+          </a:bodyPr>
+          <a:lstStyle/>
+          <a:p>
+            <a:r>
+              <a:rPr kumimoji="1" lang="ja-JP" altLang="en-US" sz="4000" b="1" spc="200" dirty="0">
+                <a:solidFill>
+                  <a:srgbClr val="20567E"/>
+                </a:solidFill>
+                <a:latin typeface="游ゴシック" panose="020B0400000000000000" pitchFamily="50" charset="-128"/>
+                <a:ea typeface="游ゴシック" panose="020B0400000000000000" pitchFamily="50" charset="-128"/>
+              </a:rPr>
+              <a:t>視覚と</a:t>
+            </a:r>
+            <a:r>
+              <a:rPr kumimoji="1" lang="en-US" altLang="ja-JP" sz="4000" b="1" spc="200" dirty="0">
+                <a:solidFill>
+                  <a:srgbClr val="20567E"/>
+                </a:solidFill>
+                <a:latin typeface="游ゴシック" panose="020B0400000000000000" pitchFamily="50" charset="-128"/>
+                <a:ea typeface="游ゴシック" panose="020B0400000000000000" pitchFamily="50" charset="-128"/>
+              </a:rPr>
+              <a:t>Web</a:t>
+            </a:r>
+            <a:r>
+              <a:rPr kumimoji="1" lang="ja-JP" altLang="en-US" sz="4000" b="1" spc="200" dirty="0">
+                <a:solidFill>
+                  <a:srgbClr val="20567E"/>
+                </a:solidFill>
+                <a:latin typeface="游ゴシック" panose="020B0400000000000000" pitchFamily="50" charset="-128"/>
+                <a:ea typeface="游ゴシック" panose="020B0400000000000000" pitchFamily="50" charset="-128"/>
+              </a:rPr>
+              <a:t>デザインの関係</a:t>
+            </a:r>
+            <a:endParaRPr kumimoji="1" lang="en-US" altLang="ja-JP" sz="4000" b="1" spc="200" dirty="0">
+              <a:solidFill>
+                <a:srgbClr val="20567E"/>
+              </a:solidFill>
+              <a:latin typeface="游ゴシック" panose="020B0400000000000000" pitchFamily="50" charset="-128"/>
+              <a:ea typeface="游ゴシック" panose="020B0400000000000000" pitchFamily="50" charset="-128"/>
+            </a:endParaRPr>
+          </a:p>
+        </p:txBody>
+      </p:sp>
+      <p:sp>
+        <p:nvSpPr>
+          <p:cNvPr id="3" name="テキスト ボックス 2">
+            <a:extLst>
+              <a:ext uri="{FF2B5EF4-FFF2-40B4-BE49-F238E27FC236}">
+                <a16:creationId xmlns:a16="http://schemas.microsoft.com/office/drawing/2014/main" id="{B95A743A-05C1-2450-C1F9-84BD6ADE372A}"/>
+              </a:ext>
+            </a:extLst>
+          </p:cNvPr>
+          <p:cNvSpPr txBox="1"/>
+          <p:nvPr/>
+        </p:nvSpPr>
+        <p:spPr>
+          <a:xfrm>
+            <a:off x="1057567" y="3710541"/>
+            <a:ext cx="6096000" cy="369332"/>
+          </a:xfrm>
+          <a:prstGeom prst="rect">
+            <a:avLst/>
+          </a:prstGeom>
+          <a:noFill/>
+        </p:spPr>
+        <p:txBody>
+          <a:bodyPr wrap="square">
+            <a:spAutoFit/>
+          </a:bodyPr>
+          <a:lstStyle/>
+          <a:p>
+            <a:r>
+              <a:rPr kumimoji="1" lang="ja-JP" altLang="en-US" sz="1800" b="0" i="0" u="none" strike="noStrike" cap="none" normalizeH="0" noProof="0" dirty="0">
+                <a:ln>
+                  <a:noFill/>
+                </a:ln>
+                <a:solidFill>
+                  <a:prstClr val="black"/>
+                </a:solidFill>
+                <a:effectLst/>
+                <a:uLnTx/>
+                <a:uFillTx/>
+                <a:latin typeface="游ゴシック Medium" panose="020B0500000000000000" pitchFamily="50" charset="-128"/>
+                <a:ea typeface="游ゴシック Medium" panose="020B0500000000000000" pitchFamily="50" charset="-128"/>
+              </a:rPr>
+              <a:t>グループ</a:t>
+            </a:r>
+            <a:r>
+              <a:rPr kumimoji="1" lang="en-US" altLang="ja-JP" sz="1800" b="0" i="0" u="none" strike="noStrike" cap="none" normalizeH="0" noProof="0" dirty="0">
+                <a:ln>
+                  <a:noFill/>
+                </a:ln>
+                <a:solidFill>
+                  <a:prstClr val="black"/>
+                </a:solidFill>
+                <a:effectLst/>
+                <a:uLnTx/>
+                <a:uFillTx/>
+                <a:latin typeface="游ゴシック Medium" panose="020B0500000000000000" pitchFamily="50" charset="-128"/>
+                <a:ea typeface="游ゴシック Medium" panose="020B0500000000000000" pitchFamily="50" charset="-128"/>
+              </a:rPr>
+              <a:t>18  |  </a:t>
+            </a:r>
+            <a:r>
+              <a:rPr lang="en-US" altLang="ja-JP" dirty="0">
+                <a:solidFill>
+                  <a:prstClr val="black"/>
+                </a:solidFill>
+                <a:latin typeface="游ゴシック Medium" panose="020B0500000000000000" pitchFamily="50" charset="-128"/>
+                <a:ea typeface="游ゴシック Medium" panose="020B0500000000000000" pitchFamily="50" charset="-128"/>
+              </a:rPr>
+              <a:t>3</a:t>
+            </a:r>
+            <a:r>
+              <a:rPr kumimoji="1" lang="en-US" altLang="ja-JP" sz="1800" b="0" i="0" u="none" strike="noStrike" cap="none" normalizeH="0" noProof="0" dirty="0">
+                <a:ln>
+                  <a:noFill/>
+                </a:ln>
+                <a:solidFill>
+                  <a:prstClr val="black"/>
+                </a:solidFill>
+                <a:effectLst/>
+                <a:uLnTx/>
+                <a:uFillTx/>
+                <a:latin typeface="游ゴシック Medium" panose="020B0500000000000000" pitchFamily="50" charset="-128"/>
+                <a:ea typeface="游ゴシック Medium" panose="020B0500000000000000" pitchFamily="50" charset="-128"/>
+              </a:rPr>
+              <a:t>G - </a:t>
+            </a:r>
+            <a:r>
+              <a:rPr kumimoji="1" lang="ja-JP" altLang="en-US" sz="1800" b="0" i="0" u="none" strike="noStrike" cap="none" normalizeH="0" noProof="0" dirty="0">
+                <a:ln>
+                  <a:noFill/>
+                </a:ln>
+                <a:solidFill>
+                  <a:prstClr val="black"/>
+                </a:solidFill>
+                <a:effectLst/>
+                <a:uLnTx/>
+                <a:uFillTx/>
+                <a:latin typeface="游ゴシック Medium" panose="020B0500000000000000" pitchFamily="50" charset="-128"/>
+                <a:ea typeface="游ゴシック Medium" panose="020B0500000000000000" pitchFamily="50" charset="-128"/>
+              </a:rPr>
+              <a:t>寺田侑史 ・</a:t>
+            </a:r>
+            <a:r>
+              <a:rPr kumimoji="1" lang="en-US" altLang="ja-JP" sz="1800" b="0" i="0" u="none" strike="noStrike" cap="none" normalizeH="0" noProof="0" dirty="0">
+                <a:ln>
+                  <a:noFill/>
+                </a:ln>
+                <a:solidFill>
+                  <a:prstClr val="black"/>
+                </a:solidFill>
+                <a:effectLst/>
+                <a:uLnTx/>
+                <a:uFillTx/>
+                <a:latin typeface="游ゴシック Medium" panose="020B0500000000000000" pitchFamily="50" charset="-128"/>
+                <a:ea typeface="游ゴシック Medium" panose="020B0500000000000000" pitchFamily="50" charset="-128"/>
+              </a:rPr>
+              <a:t> </a:t>
+            </a:r>
+            <a:r>
+              <a:rPr lang="en-US" altLang="ja-JP" dirty="0">
+                <a:solidFill>
+                  <a:prstClr val="black"/>
+                </a:solidFill>
+                <a:latin typeface="游ゴシック Medium" panose="020B0500000000000000" pitchFamily="50" charset="-128"/>
+                <a:ea typeface="游ゴシック Medium" panose="020B0500000000000000" pitchFamily="50" charset="-128"/>
+              </a:rPr>
+              <a:t>3F</a:t>
+            </a:r>
+            <a:r>
+              <a:rPr kumimoji="1" lang="en-US" altLang="ja-JP" sz="1800" b="0" i="0" u="none" strike="noStrike" cap="none" normalizeH="0" noProof="0" dirty="0">
+                <a:ln>
+                  <a:noFill/>
+                </a:ln>
+                <a:solidFill>
+                  <a:prstClr val="black"/>
+                </a:solidFill>
+                <a:effectLst/>
+                <a:uLnTx/>
+                <a:uFillTx/>
+                <a:latin typeface="游ゴシック Medium" panose="020B0500000000000000" pitchFamily="50" charset="-128"/>
+                <a:ea typeface="游ゴシック Medium" panose="020B0500000000000000" pitchFamily="50" charset="-128"/>
+              </a:rPr>
+              <a:t> - </a:t>
+            </a:r>
+            <a:r>
+              <a:rPr kumimoji="1" lang="ja-JP" altLang="en-US" sz="1800" b="0" i="0" u="none" strike="noStrike" cap="none" normalizeH="0" noProof="0" dirty="0">
+                <a:ln>
+                  <a:noFill/>
+                </a:ln>
+                <a:solidFill>
+                  <a:prstClr val="black"/>
+                </a:solidFill>
+                <a:effectLst/>
+                <a:uLnTx/>
+                <a:uFillTx/>
+                <a:latin typeface="游ゴシック Medium" panose="020B0500000000000000" pitchFamily="50" charset="-128"/>
+                <a:ea typeface="游ゴシック Medium" panose="020B0500000000000000" pitchFamily="50" charset="-128"/>
+              </a:rPr>
+              <a:t>安部律希</a:t>
+            </a:r>
+            <a:endParaRPr lang="ja-JP" altLang="en-US" dirty="0"/>
+          </a:p>
+        </p:txBody>
+      </p:sp>
+    </p:spTree>
+    <p:extLst>
+      <p:ext uri="{BB962C8B-B14F-4D97-AF65-F5344CB8AC3E}">
+        <p14:creationId xmlns:p14="http://schemas.microsoft.com/office/powerpoint/2010/main" val="2957692764"/>
+      </p:ext>
+    </p:extLst>
+  </p:cSld>
+  <p:clrMapOvr>
+    <a:masterClrMapping/>
+  </p:clrMapOvr>
+  <mc:AlternateContent xmlns:mc="http://schemas.openxmlformats.org/markup-compatibility/2006" xmlns:p14="http://schemas.microsoft.com/office/powerpoint/2010/main">
+    <mc:Choice Requires="p14">
+      <p:transition spd="med" p14:dur="700">
+        <p:fade/>
+      </p:transition>
+    </mc:Choice>
+    <mc:Fallback xmlns="">
+      <p:transition spd="med">
+        <p:fade/>
+      </p:transition>
+    </mc:Fallback>
+  </mc:AlternateContent>
+</p:sld>
+</file>
+
 <file path=ppt/slides/slide3.xml><?xml version="1.0" encoding="utf-8"?>
 <p:sld xmlns:a="http://schemas.openxmlformats.org/drawingml/2006/main" xmlns:r="http://schemas.openxmlformats.org/officeDocument/2006/relationships" xmlns:p="http://schemas.openxmlformats.org/presentationml/2006/main">
   <p:cSld>
@@ -13001,7 +14262,7 @@
         </p:nvSpPr>
         <p:spPr>
           <a:xfrm>
-            <a:off x="1528562" y="1444345"/>
+            <a:off x="1528562" y="1753886"/>
             <a:ext cx="3183809" cy="760465"/>
           </a:xfrm>
           <a:prstGeom prst="rect">
@@ -13053,8 +14314,8 @@
         </p:nvSpPr>
         <p:spPr>
           <a:xfrm>
-            <a:off x="1204347" y="2334673"/>
-            <a:ext cx="45719" cy="2875398"/>
+            <a:off x="1204347" y="2644214"/>
+            <a:ext cx="57716" cy="2382583"/>
           </a:xfrm>
           <a:prstGeom prst="rect">
             <a:avLst/>
@@ -13116,8 +14377,8 @@
         </p:nvSpPr>
         <p:spPr>
           <a:xfrm>
-            <a:off x="1528562" y="2249196"/>
-            <a:ext cx="3183809" cy="2960875"/>
+            <a:off x="1528562" y="2558737"/>
+            <a:ext cx="3183809" cy="2545377"/>
           </a:xfrm>
           <a:prstGeom prst="rect">
             <a:avLst/>
@@ -13268,32 +14529,7 @@
                 <a:latin typeface="游ゴシック Medium"/>
                 <a:ea typeface="游ゴシック Medium"/>
               </a:rPr>
-              <a:t>考察</a:t>
-            </a:r>
-            <a:endParaRPr lang="ja-JP" altLang="en-US" dirty="0">
-              <a:solidFill>
-                <a:srgbClr val="0A0A0A"/>
-              </a:solidFill>
-              <a:latin typeface="游ゴシック Medium" panose="020B0500000000000000" pitchFamily="50" charset="-128"/>
-              <a:ea typeface="游ゴシック Medium" panose="020B0500000000000000" pitchFamily="50" charset="-128"/>
-            </a:endParaRPr>
-          </a:p>
-          <a:p>
-            <a:pPr marL="342900" indent="-342900">
-              <a:lnSpc>
-                <a:spcPct val="150000"/>
-              </a:lnSpc>
-              <a:buAutoNum type="arabicPeriod"/>
-            </a:pPr>
-            <a:r>
-              <a:rPr lang="ja-JP" altLang="en-US" dirty="0">
-                <a:solidFill>
-                  <a:srgbClr val="0A0A0A"/>
-                </a:solidFill>
-                <a:latin typeface="游ゴシック Medium"/>
-                <a:ea typeface="游ゴシック Medium"/>
-              </a:rPr>
-              <a:t>今後の展望</a:t>
+              <a:t>結論と展望</a:t>
             </a:r>
             <a:endParaRPr lang="ja-JP" altLang="en-US" dirty="0">
               <a:solidFill>
@@ -13319,7 +14555,7 @@
         </p:nvSpPr>
         <p:spPr>
           <a:xfrm rot="19800000">
-            <a:off x="1118555" y="1701226"/>
+            <a:off x="1118555" y="2010767"/>
             <a:ext cx="217302" cy="188189"/>
           </a:xfrm>
           <a:custGeom>
@@ -13436,7 +14672,7 @@
         </p:nvSpPr>
         <p:spPr>
           <a:xfrm rot="16200000">
-            <a:off x="1010481" y="1888622"/>
+            <a:off x="1010481" y="2198163"/>
             <a:ext cx="217301" cy="188190"/>
           </a:xfrm>
           <a:custGeom>
@@ -13553,7 +14789,7 @@
         </p:nvSpPr>
         <p:spPr>
           <a:xfrm rot="16200000">
-            <a:off x="1226631" y="1888618"/>
+            <a:off x="1226631" y="2198159"/>
             <a:ext cx="217301" cy="188190"/>
           </a:xfrm>
           <a:custGeom>
@@ -13675,13 +14911,13 @@
   <p:clrMapOvr>
     <a:masterClrMapping/>
   </p:clrMapOvr>
-  <mc:AlternateContent xmlns:mc="http://schemas.openxmlformats.org/markup-compatibility/2006">
-    <mc:Choice xmlns:p159="http://schemas.microsoft.com/office/powerpoint/2015/09/main" Requires="p159">
+  <mc:AlternateContent xmlns:mc="http://schemas.openxmlformats.org/markup-compatibility/2006" xmlns:p159="http://schemas.microsoft.com/office/powerpoint/2015/09/main">
+    <mc:Choice Requires="p159">
       <p:transition spd="slow">
         <p159:morph option="byObject"/>
       </p:transition>
     </mc:Choice>
-    <mc:Fallback>
+    <mc:Fallback xmlns="">
       <p:transition spd="slow">
         <p:fade/>
       </p:transition>
@@ -14189,13 +15425,13 @@
   <p:clrMapOvr>
     <a:masterClrMapping/>
   </p:clrMapOvr>
-  <mc:AlternateContent xmlns:mc="http://schemas.openxmlformats.org/markup-compatibility/2006">
-    <mc:Choice xmlns:p14="http://schemas.microsoft.com/office/powerpoint/2010/main" Requires="p14">
+  <mc:AlternateContent xmlns:mc="http://schemas.openxmlformats.org/markup-compatibility/2006" xmlns:p14="http://schemas.microsoft.com/office/powerpoint/2010/main">
+    <mc:Choice Requires="p14">
       <p:transition spd="med" p14:dur="700">
         <p:fade/>
       </p:transition>
     </mc:Choice>
-    <mc:Fallback>
+    <mc:Fallback xmlns="">
       <p:transition spd="med">
         <p:fade/>
       </p:transition>
@@ -15336,13 +16572,13 @@
   <p:clrMapOvr>
     <a:masterClrMapping/>
   </p:clrMapOvr>
-  <mc:AlternateContent xmlns:mc="http://schemas.openxmlformats.org/markup-compatibility/2006">
-    <mc:Choice xmlns:p159="http://schemas.microsoft.com/office/powerpoint/2015/09/main" Requires="p159">
+  <mc:AlternateContent xmlns:mc="http://schemas.openxmlformats.org/markup-compatibility/2006" xmlns:p159="http://schemas.microsoft.com/office/powerpoint/2015/09/main">
+    <mc:Choice Requires="p159">
       <p:transition spd="slow">
         <p159:morph option="byObject"/>
       </p:transition>
     </mc:Choice>
-    <mc:Fallback>
+    <mc:Fallback xmlns="">
       <p:transition spd="slow">
         <p:fade/>
       </p:transition>
@@ -15826,7 +17062,7 @@
                 <a:latin typeface="Inter Medium"/>
                 <a:ea typeface="游ゴシック"/>
               </a:rPr>
-              <a:t>Pre-searched Information</a:t>
+              <a:t>Prior Research</a:t>
             </a:r>
           </a:p>
         </p:txBody>
@@ -16327,7 +17563,7 @@
                         <p:par>
                           <p:cTn id="19" fill="hold">
                             <p:stCondLst>
-                              <p:cond delay="622"/>
+                              <p:cond delay="522"/>
                             </p:stCondLst>
                             <p:childTnLst>
                               <p:par>
@@ -16366,7 +17602,7 @@
                         <p:par>
                           <p:cTn id="22" fill="hold">
                             <p:stCondLst>
-                              <p:cond delay="673"/>
+                              <p:cond delay="573"/>
                             </p:stCondLst>
                             <p:childTnLst>
                               <p:par>
@@ -17737,13 +18973,13 @@
   <p:clrMapOvr>
     <a:masterClrMapping/>
   </p:clrMapOvr>
-  <mc:AlternateContent xmlns:mc="http://schemas.openxmlformats.org/markup-compatibility/2006">
-    <mc:Choice xmlns:p14="http://schemas.microsoft.com/office/powerpoint/2010/main" Requires="p14">
+  <mc:AlternateContent xmlns:mc="http://schemas.openxmlformats.org/markup-compatibility/2006" xmlns:p14="http://schemas.microsoft.com/office/powerpoint/2010/main">
+    <mc:Choice Requires="p14">
       <p:transition spd="med" p14:dur="700">
         <p:fade/>
       </p:transition>
     </mc:Choice>
-    <mc:Fallback>
+    <mc:Fallback xmlns="">
       <p:transition spd="med">
         <p:fade/>
       </p:transition>
@@ -19338,7 +20574,7 @@
                 <a:latin typeface="游ゴシック Medium" panose="020B0500000000000000" pitchFamily="50" charset="-128"/>
                 <a:ea typeface="游ゴシック Medium" panose="020B0500000000000000" pitchFamily="50" charset="-128"/>
               </a:rPr>
-              <a:t>明るい部分と暗い部分の明るさ比こと</a:t>
+              <a:t>明るい部分と暗い部分の明るさの比のこと</a:t>
             </a:r>
             <a:endParaRPr lang="en-US" altLang="ja-JP" dirty="0">
               <a:latin typeface="游ゴシック Medium" panose="020B0500000000000000" pitchFamily="50" charset="-128"/>

</xml_diff>